<commit_message>
forgot to delete a slide
</commit_message>
<xml_diff>
--- a/1. Decision Trees/slides.pptx
+++ b/1. Decision Trees/slides.pptx
@@ -5,7 +5,7 @@
     <p:sldMasterId id="2147483660" r:id="rId1"/>
   </p:sldMasterIdLst>
   <p:notesMasterIdLst>
-    <p:notesMasterId r:id="rId28"/>
+    <p:notesMasterId r:id="rId27"/>
   </p:notesMasterIdLst>
   <p:sldIdLst>
     <p:sldId id="256" r:id="rId2"/>
@@ -33,7 +33,6 @@
     <p:sldId id="277" r:id="rId24"/>
     <p:sldId id="279" r:id="rId25"/>
     <p:sldId id="291" r:id="rId26"/>
-    <p:sldId id="280" r:id="rId27"/>
   </p:sldIdLst>
   <p:sldSz cx="12192000" cy="6858000"/>
   <p:notesSz cx="6858000" cy="9144000"/>
@@ -2291,11 +2290,7 @@
             </a:r>
             <a:r>
               <a:rPr lang="en-US" dirty="0"/>
-              <a:t>should focus on social environments rather than just individual education (it’s not enough to say drugs bad). We have to do it in a way that avoid stigmatization people aren’t really receptive to perceived attacks/insulted/judgement from above. You have to be empathetic, genuinely try to understand their situation and help them, not deliver top-down commands (that might only fuel </a:t>
-            </a:r>
-            <a:r>
-              <a:rPr lang="en-US"/>
-              <a:t>a rebellious streak, and it’s also just not kind).</a:t>
+              <a:t>should focus on social environments rather than just individual education (it’s not enough to say drugs bad). We have to do it in a way that avoid stigmatization people aren’t really receptive to perceived attacks/insulted/judgement from above. You have to be empathetic, genuinely try to understand their situation and help them, not deliver top-down commands (that might only fuel a rebellious streak, and it’s also just not kind).</a:t>
             </a:r>
             <a:endParaRPr lang="en-US" sz="1200" dirty="0"/>
           </a:p>
@@ -2392,7 +2387,16 @@
           <a:p>
             <a:r>
               <a:rPr lang="en-US" dirty="0"/>
-              <a:t>Explored youth drug use using the 2023 NSDUH dataset, which includes usage statistics for alcohol, marijuana, and cigarettes, demographics, and youth-specific questions</a:t>
+              <a:t>Explored youth drug use using the 2023 NSDUH dataset, which includes usage statistics for alcohol, marijuana, and cigarettes, demographics, and youth-specific questions.</a:t>
+            </a:r>
+          </a:p>
+          <a:p>
+            <a:endParaRPr lang="en-US" dirty="0"/>
+          </a:p>
+          <a:p>
+            <a:r>
+              <a:rPr lang="en-US" dirty="0"/>
+              <a:t>QUESTION</a:t>
             </a:r>
           </a:p>
           <a:p>
@@ -2485,6 +2489,15 @@
           <a:p>
             <a:r>
               <a:rPr lang="en-US" dirty="0"/>
+              <a:t>Theoretical Background</a:t>
+            </a:r>
+          </a:p>
+          <a:p>
+            <a:endParaRPr lang="en-US" dirty="0"/>
+          </a:p>
+          <a:p>
+            <a:r>
+              <a:rPr lang="en-US" dirty="0"/>
               <a:t>Decision trees split the predictor space into rectangles and just predict some aggregate of the training observations in the rectangles (mean for regression, mode for classification)</a:t>
             </a:r>
           </a:p>
@@ -2495,6 +2508,15 @@
             <a:r>
               <a:rPr lang="en-US" dirty="0"/>
               <a:t>For example, we would predict the mean of the observations in R1</a:t>
+            </a:r>
+          </a:p>
+          <a:p>
+            <a:endParaRPr lang="en-US" dirty="0"/>
+          </a:p>
+          <a:p>
+            <a:r>
+              <a:rPr lang="en-US" dirty="0"/>
+              <a:t>They are called decision TREES because…</a:t>
             </a:r>
           </a:p>
         </p:txBody>
@@ -2581,7 +2603,7 @@
           <a:p>
             <a:r>
               <a:rPr lang="en-US" dirty="0"/>
-              <a:t>Decision trees are convenient because they work for both regression and classification (and you don’t have to one-hot-encode!) and they are easy to understand and explain. The downside is that they are very flexible and tend to overfit the training data.</a:t>
+              <a:t>Decision trees are convenient because they are easy to use, understand, and explain. They work for both regression and classification (and you don’t have to one-hot-encode!). The downside is that they are very flexible and tend to overfit the training data.</a:t>
             </a:r>
           </a:p>
           <a:p>
@@ -2677,6 +2699,15 @@
           <a:p>
             <a:r>
               <a:rPr lang="en-US" dirty="0"/>
+              <a:t>Decision trees have a lot of variance, they tend to overfit. We can try to use bagging to fix this.</a:t>
+            </a:r>
+          </a:p>
+          <a:p>
+            <a:endParaRPr lang="en-US" dirty="0"/>
+          </a:p>
+          <a:p>
+            <a:r>
+              <a:rPr lang="en-US" dirty="0"/>
               <a:t>Bagging is a general strategy that reduces variance by averaging many models together: we use bootstrap resampling to obtain multiple training sets, train models on the training sets, and then average their predictions. Unfortunately, this boost in performance comes at the cost of interpretability (it’s hard to interpret the aggregate of hundreds of trees).</a:t>
             </a:r>
           </a:p>
@@ -2687,6 +2718,23 @@
             <a:r>
               <a:rPr lang="en-US" dirty="0"/>
               <a:t>Luckily, we can use variable importance measures to see which predicts are the most important. These work by basically looking at how much splitting on that variable improves metrics.</a:t>
+            </a:r>
+          </a:p>
+          <a:p>
+            <a:endParaRPr lang="en-US" dirty="0"/>
+          </a:p>
+          <a:p>
+            <a:r>
+              <a:rPr lang="en-US" dirty="0"/>
+              <a:t>One thing to note is that </a:t>
+            </a:r>
+            <a:r>
+              <a:rPr lang="en-US" dirty="0" err="1"/>
+              <a:t>baggind</a:t>
+            </a:r>
+            <a:r>
+              <a:rPr lang="en-US" dirty="0"/>
+              <a:t> doesn’t NEED a validation set because…</a:t>
             </a:r>
           </a:p>
         </p:txBody>
@@ -2870,6 +2918,15 @@
             <a:r>
               <a:rPr lang="en-US" dirty="0"/>
               <a:t>Boosting takes a different approach than bagging and random forests: Instead of constructing its trees independently and then averaging, it builds its trees sequentially and each trees contribution is weighted. The core idea is to grow new trees to learn from past mistakes.</a:t>
+            </a:r>
+          </a:p>
+          <a:p>
+            <a:endParaRPr lang="en-US" dirty="0"/>
+          </a:p>
+          <a:p>
+            <a:r>
+              <a:rPr lang="en-US" dirty="0"/>
+              <a:t>Boosting has three parameters… you have to use a validation approach to choose them.</a:t>
             </a:r>
           </a:p>
         </p:txBody>
@@ -10942,124 +10999,6 @@
     <p:extLst>
       <p:ext uri="{BB962C8B-B14F-4D97-AF65-F5344CB8AC3E}">
         <p14:creationId xmlns:p14="http://schemas.microsoft.com/office/powerpoint/2010/main" val="1979839069"/>
-      </p:ext>
-    </p:extLst>
-  </p:cSld>
-  <p:clrMapOvr>
-    <a:masterClrMapping/>
-  </p:clrMapOvr>
-</p:sld>
-</file>
-
-<file path=ppt/slides/slide26.xml><?xml version="1.0" encoding="utf-8"?>
-<p:sld xmlns:a="http://schemas.openxmlformats.org/drawingml/2006/main" xmlns:r="http://schemas.openxmlformats.org/officeDocument/2006/relationships" xmlns:p="http://schemas.openxmlformats.org/presentationml/2006/main">
-  <p:cSld>
-    <p:spTree>
-      <p:nvGrpSpPr>
-        <p:cNvPr id="1" name=""/>
-        <p:cNvGrpSpPr/>
-        <p:nvPr/>
-      </p:nvGrpSpPr>
-      <p:grpSpPr>
-        <a:xfrm>
-          <a:off x="0" y="0"/>
-          <a:ext cx="0" cy="0"/>
-          <a:chOff x="0" y="0"/>
-          <a:chExt cx="0" cy="0"/>
-        </a:xfrm>
-      </p:grpSpPr>
-      <p:sp>
-        <p:nvSpPr>
-          <p:cNvPr id="2" name="Title 1">
-            <a:extLst>
-              <a:ext uri="{FF2B5EF4-FFF2-40B4-BE49-F238E27FC236}">
-                <a16:creationId xmlns:a16="http://schemas.microsoft.com/office/drawing/2014/main" id="{0CEB1FE7-DD62-6950-03C6-D1B3C25E92D0}"/>
-              </a:ext>
-            </a:extLst>
-          </p:cNvPr>
-          <p:cNvSpPr>
-            <a:spLocks noGrp="1"/>
-          </p:cNvSpPr>
-          <p:nvPr>
-            <p:ph type="title"/>
-          </p:nvPr>
-        </p:nvSpPr>
-        <p:spPr/>
-        <p:txBody>
-          <a:bodyPr/>
-          <a:lstStyle/>
-          <a:p>
-            <a:r>
-              <a:rPr lang="en-US" dirty="0"/>
-              <a:t>Conclusions</a:t>
-            </a:r>
-          </a:p>
-        </p:txBody>
-      </p:sp>
-      <p:sp>
-        <p:nvSpPr>
-          <p:cNvPr id="3" name="Content Placeholder 2">
-            <a:extLst>
-              <a:ext uri="{FF2B5EF4-FFF2-40B4-BE49-F238E27FC236}">
-                <a16:creationId xmlns:a16="http://schemas.microsoft.com/office/drawing/2014/main" id="{8A269041-2BBA-FC2B-8003-8EEF2CEF0380}"/>
-              </a:ext>
-            </a:extLst>
-          </p:cNvPr>
-          <p:cNvSpPr>
-            <a:spLocks noGrp="1"/>
-          </p:cNvSpPr>
-          <p:nvPr>
-            <p:ph idx="1"/>
-          </p:nvPr>
-        </p:nvSpPr>
-        <p:spPr/>
-        <p:txBody>
-          <a:bodyPr>
-            <a:normAutofit/>
-          </a:bodyPr>
-          <a:lstStyle/>
-          <a:p>
-            <a:r>
-              <a:rPr lang="en-US" dirty="0"/>
-              <a:t>Alcohol binary classification was mostly a wash, perhaps identifying a correlation with peer alcohol consumption, family income, and thoughts about marijuana</a:t>
-            </a:r>
-          </a:p>
-          <a:p>
-            <a:r>
-              <a:rPr lang="en-US" dirty="0"/>
-              <a:t> Marijuana multi-class classification was stronger, perhaps identifying a correlation with whether youth has sold illegal drugs, family income, father availability in the household, and how youth thinks their parents would feel them using marijuana</a:t>
-            </a:r>
-          </a:p>
-          <a:p>
-            <a:r>
-              <a:rPr lang="en-US" dirty="0"/>
-              <a:t>Cigarette regression was the strongest, identifying a correlation with whether youth stole or tried to steal and item more expensive than $50, whether youth sold illegal drugs, their current grade, how youth feels about peers smoking/drinking, and how youth thinks their parents would feel about them smoking 1+ pack a day</a:t>
-            </a:r>
-          </a:p>
-          <a:p>
-            <a:r>
-              <a:rPr lang="en-US" dirty="0"/>
-              <a:t>Throughline: Other substance usage/interaction, peer usage, parental attitude towards substance usage, and perhaps family income</a:t>
-            </a:r>
-          </a:p>
-          <a:p>
-            <a:pPr marL="0" indent="0">
-              <a:buNone/>
-            </a:pPr>
-            <a:endParaRPr lang="en-US" sz="2000" dirty="0"/>
-          </a:p>
-          <a:p>
-            <a:endParaRPr lang="en-US" dirty="0"/>
-          </a:p>
-          <a:p>
-            <a:endParaRPr lang="en-US" dirty="0"/>
-          </a:p>
-        </p:txBody>
-      </p:sp>
-    </p:spTree>
-    <p:extLst>
-      <p:ext uri="{BB962C8B-B14F-4D97-AF65-F5344CB8AC3E}">
-        <p14:creationId xmlns:p14="http://schemas.microsoft.com/office/powerpoint/2010/main" val="132550624"/>
       </p:ext>
     </p:extLst>
   </p:cSld>

</xml_diff>